<commit_message>
[#132] DeveloperGuide: Add Calendar Implementation (#201)
* Added comment

* Update calendar implementation

* Edit HTML link
</commit_message>
<xml_diff>
--- a/docs/diagrams/CalendarComponentClassDiagram.pptx
+++ b/docs/diagrams/CalendarComponentClassDiagram.pptx
@@ -208,7 +208,7 @@
           <a:p>
             <a:fld id="{F5CC4B3F-88C1-4FFA-B1B6-F41C21DC6924}" type="datetimeFigureOut">
               <a:rPr lang="en-US" smtClean="0"/>
-              <a:t>3/20/18</a:t>
+              <a:t>4/5/18</a:t>
             </a:fld>
             <a:endParaRPr lang="en-US"/>
           </a:p>
@@ -654,7 +654,7 @@
           <a:p>
             <a:fld id="{78C97017-6FC3-485B-9764-EAC9E56C1D49}" type="datetimeFigureOut">
               <a:rPr lang="en-US" smtClean="0"/>
-              <a:t>3/20/18</a:t>
+              <a:t>4/5/18</a:t>
             </a:fld>
             <a:endParaRPr lang="en-US"/>
           </a:p>
@@ -822,7 +822,7 @@
           <a:p>
             <a:fld id="{78C97017-6FC3-485B-9764-EAC9E56C1D49}" type="datetimeFigureOut">
               <a:rPr lang="en-US" smtClean="0"/>
-              <a:t>3/20/18</a:t>
+              <a:t>4/5/18</a:t>
             </a:fld>
             <a:endParaRPr lang="en-US"/>
           </a:p>
@@ -1000,7 +1000,7 @@
           <a:p>
             <a:fld id="{78C97017-6FC3-485B-9764-EAC9E56C1D49}" type="datetimeFigureOut">
               <a:rPr lang="en-US" smtClean="0"/>
-              <a:t>3/20/18</a:t>
+              <a:t>4/5/18</a:t>
             </a:fld>
             <a:endParaRPr lang="en-US"/>
           </a:p>
@@ -1168,7 +1168,7 @@
           <a:p>
             <a:fld id="{78C97017-6FC3-485B-9764-EAC9E56C1D49}" type="datetimeFigureOut">
               <a:rPr lang="en-US" smtClean="0"/>
-              <a:t>3/20/18</a:t>
+              <a:t>4/5/18</a:t>
             </a:fld>
             <a:endParaRPr lang="en-US"/>
           </a:p>
@@ -1413,7 +1413,7 @@
           <a:p>
             <a:fld id="{78C97017-6FC3-485B-9764-EAC9E56C1D49}" type="datetimeFigureOut">
               <a:rPr lang="en-US" smtClean="0"/>
-              <a:t>3/20/18</a:t>
+              <a:t>4/5/18</a:t>
             </a:fld>
             <a:endParaRPr lang="en-US"/>
           </a:p>
@@ -1698,7 +1698,7 @@
           <a:p>
             <a:fld id="{78C97017-6FC3-485B-9764-EAC9E56C1D49}" type="datetimeFigureOut">
               <a:rPr lang="en-US" smtClean="0"/>
-              <a:t>3/20/18</a:t>
+              <a:t>4/5/18</a:t>
             </a:fld>
             <a:endParaRPr lang="en-US"/>
           </a:p>
@@ -2117,7 +2117,7 @@
           <a:p>
             <a:fld id="{78C97017-6FC3-485B-9764-EAC9E56C1D49}" type="datetimeFigureOut">
               <a:rPr lang="en-US" smtClean="0"/>
-              <a:t>3/20/18</a:t>
+              <a:t>4/5/18</a:t>
             </a:fld>
             <a:endParaRPr lang="en-US"/>
           </a:p>
@@ -2234,7 +2234,7 @@
           <a:p>
             <a:fld id="{78C97017-6FC3-485B-9764-EAC9E56C1D49}" type="datetimeFigureOut">
               <a:rPr lang="en-US" smtClean="0"/>
-              <a:t>3/20/18</a:t>
+              <a:t>4/5/18</a:t>
             </a:fld>
             <a:endParaRPr lang="en-US"/>
           </a:p>
@@ -2329,7 +2329,7 @@
           <a:p>
             <a:fld id="{78C97017-6FC3-485B-9764-EAC9E56C1D49}" type="datetimeFigureOut">
               <a:rPr lang="en-US" smtClean="0"/>
-              <a:t>3/20/18</a:t>
+              <a:t>4/5/18</a:t>
             </a:fld>
             <a:endParaRPr lang="en-US"/>
           </a:p>
@@ -2604,7 +2604,7 @@
           <a:p>
             <a:fld id="{78C97017-6FC3-485B-9764-EAC9E56C1D49}" type="datetimeFigureOut">
               <a:rPr lang="en-US" smtClean="0"/>
-              <a:t>3/20/18</a:t>
+              <a:t>4/5/18</a:t>
             </a:fld>
             <a:endParaRPr lang="en-US"/>
           </a:p>
@@ -2856,7 +2856,7 @@
           <a:p>
             <a:fld id="{78C97017-6FC3-485B-9764-EAC9E56C1D49}" type="datetimeFigureOut">
               <a:rPr lang="en-US" smtClean="0"/>
-              <a:t>3/20/18</a:t>
+              <a:t>4/5/18</a:t>
             </a:fld>
             <a:endParaRPr lang="en-US"/>
           </a:p>
@@ -3067,7 +3067,7 @@
           <a:p>
             <a:fld id="{78C97017-6FC3-485B-9764-EAC9E56C1D49}" type="datetimeFigureOut">
               <a:rPr lang="en-US" smtClean="0"/>
-              <a:t>3/20/18</a:t>
+              <a:t>4/5/18</a:t>
             </a:fld>
             <a:endParaRPr lang="en-US"/>
           </a:p>
@@ -3444,20 +3444,14 @@
       </p:grpSpPr>
       <p:sp>
         <p:nvSpPr>
-          <p:cNvPr id="31" name="Rectangle 65">
-            <a:extLst>
-              <a:ext uri="{FF2B5EF4-FFF2-40B4-BE49-F238E27FC236}">
-                <a16:creationId xmlns:a16="http://schemas.microsoft.com/office/drawing/2014/main" id="{6348F135-FE57-9042-8887-86186154AAD3}"/>
-              </a:ext>
-            </a:extLst>
-          </p:cNvPr>
+          <p:cNvPr id="23" name="Rectangle 65"/>
           <p:cNvSpPr/>
           <p:nvPr/>
         </p:nvSpPr>
         <p:spPr>
           <a:xfrm>
-            <a:off x="204225" y="232666"/>
-            <a:ext cx="5967975" cy="6320534"/>
+            <a:off x="1676400" y="1447800"/>
+            <a:ext cx="4458148" cy="3200400"/>
           </a:xfrm>
           <a:prstGeom prst="roundRect">
             <a:avLst>
@@ -3490,6 +3484,16 @@
           <a:bodyPr rtlCol="0" anchor="t"/>
           <a:lstStyle/>
           <a:p>
+            <a:r>
+              <a:rPr lang="en-US" sz="1200" b="1" dirty="0">
+                <a:solidFill>
+                  <a:schemeClr val="accent3">
+                    <a:lumMod val="75000"/>
+                  </a:schemeClr>
+                </a:solidFill>
+              </a:rPr>
+              <a:t>UI</a:t>
+            </a:r>
             <a:endParaRPr lang="en-SG" sz="1200" b="1" dirty="0">
               <a:solidFill>
                 <a:schemeClr val="accent3">
@@ -3508,7 +3512,7 @@
         </p:nvSpPr>
         <p:spPr>
           <a:xfrm>
-            <a:off x="2095948" y="1179896"/>
+            <a:off x="2095948" y="2341220"/>
             <a:ext cx="1093635" cy="346760"/>
           </a:xfrm>
           <a:prstGeom prst="rect">
@@ -3562,115 +3566,13 @@
       </p:sp>
       <p:sp>
         <p:nvSpPr>
-          <p:cNvPr id="9" name="Rectangle 62"/>
-          <p:cNvSpPr/>
-          <p:nvPr/>
-        </p:nvSpPr>
-        <p:spPr>
-          <a:xfrm>
-            <a:off x="2092842" y="609600"/>
-            <a:ext cx="1093635" cy="346760"/>
-          </a:xfrm>
-          <a:prstGeom prst="rect">
-            <a:avLst/>
-          </a:prstGeom>
-          <a:solidFill>
-            <a:srgbClr val="00B050"/>
-          </a:solidFill>
-          <a:ln w="19050">
-            <a:solidFill>
-              <a:srgbClr val="00B050"/>
-            </a:solidFill>
-          </a:ln>
-          <a:effectLst/>
-        </p:spPr>
-        <p:style>
-          <a:lnRef idx="1">
-            <a:schemeClr val="accent2"/>
-          </a:lnRef>
-          <a:fillRef idx="2">
-            <a:schemeClr val="accent2"/>
-          </a:fillRef>
-          <a:effectRef idx="1">
-            <a:schemeClr val="accent2"/>
-          </a:effectRef>
-          <a:fontRef idx="minor">
-            <a:schemeClr val="dk1"/>
-          </a:fontRef>
-        </p:style>
-        <p:txBody>
-          <a:bodyPr rtlCol="0" anchor="ctr"/>
-          <a:lstStyle/>
-          <a:p>
-            <a:pPr algn="ctr"/>
-            <a:r>
-              <a:rPr lang="en-US" sz="1050" dirty="0" err="1">
-                <a:solidFill>
-                  <a:schemeClr val="bg1"/>
-                </a:solidFill>
-              </a:rPr>
-              <a:t>UiManager</a:t>
-            </a:r>
-            <a:endParaRPr lang="en-SG" sz="1050" dirty="0">
-              <a:solidFill>
-                <a:schemeClr val="bg1"/>
-              </a:solidFill>
-            </a:endParaRPr>
-          </a:p>
-        </p:txBody>
-      </p:sp>
-      <p:cxnSp>
-        <p:nvCxnSpPr>
-          <p:cNvPr id="10" name="Elbow Connector 63"/>
-          <p:cNvCxnSpPr>
-            <a:stCxn id="9" idx="2"/>
-            <a:endCxn id="2" idx="0"/>
-          </p:cNvCxnSpPr>
-          <p:nvPr/>
-        </p:nvCxnSpPr>
-        <p:spPr>
-          <a:xfrm rot="16200000" flipH="1">
-            <a:off x="2529445" y="1066575"/>
-            <a:ext cx="223536" cy="3106"/>
-          </a:xfrm>
-          <a:prstGeom prst="bentConnector3">
-            <a:avLst>
-              <a:gd name="adj1" fmla="val 50000"/>
-            </a:avLst>
-          </a:prstGeom>
-          <a:ln w="19050">
-            <a:solidFill>
-              <a:srgbClr val="00B050"/>
-            </a:solidFill>
-            <a:headEnd type="none" w="med" len="med"/>
-            <a:tailEnd type="arrow" w="med" len="med"/>
-          </a:ln>
-          <a:effectLst/>
-        </p:spPr>
-        <p:style>
-          <a:lnRef idx="1">
-            <a:schemeClr val="accent2"/>
-          </a:lnRef>
-          <a:fillRef idx="2">
-            <a:schemeClr val="accent2"/>
-          </a:fillRef>
-          <a:effectRef idx="1">
-            <a:schemeClr val="accent2"/>
-          </a:effectRef>
-          <a:fontRef idx="minor">
-            <a:schemeClr val="dk1"/>
-          </a:fontRef>
-        </p:style>
-      </p:cxnSp>
-      <p:sp>
-        <p:nvSpPr>
           <p:cNvPr id="16" name="Isosceles Triangle 102"/>
           <p:cNvSpPr/>
           <p:nvPr/>
         </p:nvSpPr>
         <p:spPr>
           <a:xfrm rot="10800000" flipV="1">
-            <a:off x="5394717" y="949153"/>
+            <a:off x="5394717" y="2110477"/>
             <a:ext cx="270504" cy="175523"/>
           </a:xfrm>
           <a:prstGeom prst="triangle">
@@ -3710,31 +3612,28 @@
           </a:p>
         </p:txBody>
       </p:sp>
-      <p:cxnSp>
-        <p:nvCxnSpPr>
-          <p:cNvPr id="19" name="Elbow Connector 122"/>
-          <p:cNvCxnSpPr/>
+      <p:sp>
+        <p:nvSpPr>
+          <p:cNvPr id="22" name="Rectangle 65"/>
+          <p:cNvSpPr/>
           <p:nvPr/>
-        </p:nvCxnSpPr>
+        </p:nvSpPr>
         <p:spPr>
-          <a:xfrm flipV="1">
-            <a:off x="304800" y="1873257"/>
-            <a:ext cx="684904" cy="1"/>
+          <a:xfrm rot="16200000">
+            <a:off x="5883709" y="2284996"/>
+            <a:ext cx="2002442" cy="328045"/>
           </a:xfrm>
-          <a:prstGeom prst="bentConnector3">
-            <a:avLst>
-              <a:gd name="adj1" fmla="val 50000"/>
-            </a:avLst>
+          <a:prstGeom prst="roundRect">
+            <a:avLst/>
           </a:prstGeom>
+          <a:solidFill>
+            <a:schemeClr val="accent1">
+              <a:lumMod val="20000"/>
+              <a:lumOff val="80000"/>
+            </a:schemeClr>
+          </a:solidFill>
           <a:ln w="19050">
-            <a:solidFill>
-              <a:schemeClr val="bg1">
-                <a:lumMod val="75000"/>
-              </a:schemeClr>
-            </a:solidFill>
-            <a:prstDash val="sysDot"/>
-            <a:headEnd type="none" w="med" len="med"/>
-            <a:tailEnd type="arrow" w="med" len="med"/>
+            <a:noFill/>
           </a:ln>
           <a:effectLst/>
         </p:spPr>
@@ -3752,7 +3651,87 @@
             <a:schemeClr val="dk1"/>
           </a:fontRef>
         </p:style>
-      </p:cxnSp>
+        <p:txBody>
+          <a:bodyPr rtlCol="0" anchor="ctr"/>
+          <a:lstStyle/>
+          <a:p>
+            <a:pPr algn="ctr"/>
+            <a:r>
+              <a:rPr lang="en-US" sz="1100" b="1" dirty="0">
+                <a:solidFill>
+                  <a:schemeClr val="bg1"/>
+                </a:solidFill>
+              </a:rPr>
+              <a:t>Logic</a:t>
+            </a:r>
+            <a:endParaRPr lang="en-SG" sz="1100" b="1" dirty="0">
+              <a:solidFill>
+                <a:schemeClr val="bg1"/>
+              </a:solidFill>
+            </a:endParaRPr>
+          </a:p>
+        </p:txBody>
+      </p:sp>
+      <p:sp>
+        <p:nvSpPr>
+          <p:cNvPr id="34" name="Rectangle 11"/>
+          <p:cNvSpPr/>
+          <p:nvPr/>
+        </p:nvSpPr>
+        <p:spPr>
+          <a:xfrm>
+            <a:off x="2582371" y="2959379"/>
+            <a:ext cx="1093635" cy="236841"/>
+          </a:xfrm>
+          <a:prstGeom prst="rect">
+            <a:avLst/>
+          </a:prstGeom>
+          <a:ln w="19050">
+            <a:solidFill>
+              <a:schemeClr val="accent3"/>
+            </a:solidFill>
+          </a:ln>
+          <a:effectLst/>
+        </p:spPr>
+        <p:style>
+          <a:lnRef idx="1">
+            <a:schemeClr val="accent3"/>
+          </a:lnRef>
+          <a:fillRef idx="2">
+            <a:schemeClr val="accent3"/>
+          </a:fillRef>
+          <a:effectRef idx="1">
+            <a:schemeClr val="accent3"/>
+          </a:effectRef>
+          <a:fontRef idx="minor">
+            <a:schemeClr val="dk1"/>
+          </a:fontRef>
+        </p:style>
+        <p:txBody>
+          <a:bodyPr rtlCol="0" anchor="ctr"/>
+          <a:lstStyle/>
+          <a:p>
+            <a:pPr algn="ctr"/>
+            <a:r>
+              <a:rPr lang="en-US" sz="1050" b="1" dirty="0" err="1">
+                <a:solidFill>
+                  <a:schemeClr val="accent3">
+                    <a:lumMod val="75000"/>
+                  </a:schemeClr>
+                </a:solidFill>
+              </a:rPr>
+              <a:t>CalendarPanel</a:t>
+            </a:r>
+            <a:endParaRPr lang="en-SG" sz="1050" b="1" dirty="0">
+              <a:solidFill>
+                <a:schemeClr val="accent3">
+                  <a:lumMod val="75000"/>
+                </a:schemeClr>
+              </a:solidFill>
+            </a:endParaRPr>
+          </a:p>
+        </p:txBody>
+      </p:sp>
       <p:sp>
         <p:nvSpPr>
           <p:cNvPr id="39" name="Flowchart: Decision 38"/>
@@ -3761,7 +3740,7 @@
         </p:nvSpPr>
         <p:spPr>
           <a:xfrm>
-            <a:off x="2554445" y="1532480"/>
+            <a:off x="2324548" y="2706452"/>
             <a:ext cx="183156" cy="161573"/>
           </a:xfrm>
           <a:prstGeom prst="flowChartDecision">
@@ -3805,19 +3784,18 @@
         <p:nvCxnSpPr>
           <p:cNvPr id="44" name="Elbow Connector 63"/>
           <p:cNvCxnSpPr>
-            <a:cxnSpLocks/>
+            <a:stCxn id="39" idx="2"/>
+            <a:endCxn id="34" idx="1"/>
           </p:cNvCxnSpPr>
           <p:nvPr/>
         </p:nvCxnSpPr>
         <p:spPr>
-          <a:xfrm rot="5400000">
-            <a:off x="2374716" y="1922545"/>
-            <a:ext cx="542615" cy="1"/>
+          <a:xfrm rot="16200000" flipH="1">
+            <a:off x="2394361" y="2889789"/>
+            <a:ext cx="209775" cy="166245"/>
           </a:xfrm>
-          <a:prstGeom prst="bentConnector3">
-            <a:avLst>
-              <a:gd name="adj1" fmla="val 50000"/>
-            </a:avLst>
+          <a:prstGeom prst="bentConnector2">
+            <a:avLst/>
           </a:prstGeom>
           <a:ln w="19050">
             <a:solidFill>
@@ -3851,7 +3829,7 @@
         </p:nvSpPr>
         <p:spPr>
           <a:xfrm>
-            <a:off x="5143948" y="609600"/>
+            <a:off x="5143948" y="1770924"/>
             <a:ext cx="772043" cy="346760"/>
           </a:xfrm>
           <a:prstGeom prst="rect">
@@ -3928,14 +3906,14 @@
           <p:cNvCxnSpPr>
             <a:cxnSpLocks/>
             <a:stCxn id="16" idx="3"/>
-            <a:endCxn id="27" idx="3"/>
+            <a:endCxn id="34" idx="3"/>
           </p:cNvCxnSpPr>
           <p:nvPr/>
         </p:nvCxnSpPr>
         <p:spPr>
           <a:xfrm rot="5400000">
-            <a:off x="3891119" y="776260"/>
-            <a:ext cx="1290434" cy="1987267"/>
+            <a:off x="4207088" y="1754919"/>
+            <a:ext cx="791800" cy="1853963"/>
           </a:xfrm>
           <a:prstGeom prst="bentConnector2">
             <a:avLst/>
@@ -3975,7 +3953,7 @@
         </p:nvCxnSpPr>
         <p:spPr>
           <a:xfrm flipV="1">
-            <a:off x="3189583" y="1124676"/>
+            <a:off x="3189583" y="2286000"/>
             <a:ext cx="2340386" cy="228600"/>
           </a:xfrm>
           <a:prstGeom prst="bentConnector2">
@@ -4007,25 +3985,26 @@
       </p:cxnSp>
       <p:sp>
         <p:nvSpPr>
-          <p:cNvPr id="119" name="Rectangle 62"/>
+          <p:cNvPr id="117" name="Rectangle 65"/>
           <p:cNvSpPr/>
           <p:nvPr/>
         </p:nvSpPr>
         <p:spPr>
           <a:xfrm rot="16200000">
-            <a:off x="649784" y="1699876"/>
-            <a:ext cx="1093635" cy="346760"/>
+            <a:off x="6359771" y="3944407"/>
+            <a:ext cx="1079540" cy="328045"/>
           </a:xfrm>
-          <a:prstGeom prst="rect">
+          <a:prstGeom prst="roundRect">
             <a:avLst/>
           </a:prstGeom>
           <a:solidFill>
-            <a:srgbClr val="00B050"/>
+            <a:schemeClr val="accent4">
+              <a:lumMod val="20000"/>
+              <a:lumOff val="80000"/>
+            </a:schemeClr>
           </a:solidFill>
           <a:ln w="19050">
-            <a:solidFill>
-              <a:srgbClr val="00B050"/>
-            </a:solidFill>
+            <a:noFill/>
           </a:ln>
           <a:effectLst/>
         </p:spPr>
@@ -4049,25 +4028,14 @@
           <a:p>
             <a:pPr algn="ctr"/>
             <a:r>
-              <a:rPr lang="en-US" sz="1050" dirty="0">
+              <a:rPr lang="en-US" sz="1100" b="1" dirty="0">
                 <a:solidFill>
                   <a:schemeClr val="bg1"/>
                 </a:solidFill>
               </a:rPr>
-              <a:t>&lt;&lt;interface&gt;&gt;</a:t>
-            </a:r>
-          </a:p>
-          <a:p>
-            <a:pPr algn="ctr"/>
-            <a:r>
-              <a:rPr lang="en-US" sz="1050" dirty="0" err="1">
-                <a:solidFill>
-                  <a:schemeClr val="bg1"/>
-                </a:solidFill>
-              </a:rPr>
-              <a:t>Ui</a:t>
-            </a:r>
-            <a:endParaRPr lang="en-SG" sz="1050" dirty="0">
+              <a:t>Model</a:t>
+            </a:r>
+            <a:endParaRPr lang="en-SG" sz="1100" b="1" dirty="0">
               <a:solidFill>
                 <a:schemeClr val="bg1"/>
               </a:solidFill>
@@ -4077,21 +4045,297 @@
       </p:sp>
       <p:sp>
         <p:nvSpPr>
-          <p:cNvPr id="120" name="Isosceles Triangle 102"/>
+          <p:cNvPr id="143" name="Rectangle 142"/>
           <p:cNvSpPr/>
           <p:nvPr/>
         </p:nvSpPr>
         <p:spPr>
+          <a:xfrm>
+            <a:off x="5435896" y="2743200"/>
+            <a:ext cx="229325" cy="166560"/>
+          </a:xfrm>
+          <a:prstGeom prst="rect">
+            <a:avLst/>
+          </a:prstGeom>
+          <a:solidFill>
+            <a:schemeClr val="accent3">
+              <a:lumMod val="20000"/>
+              <a:lumOff val="80000"/>
+              <a:alpha val="80000"/>
+            </a:schemeClr>
+          </a:solidFill>
+          <a:ln>
+            <a:noFill/>
+          </a:ln>
+          <a:effectLst>
+            <a:softEdge rad="31750"/>
+          </a:effectLst>
+        </p:spPr>
+        <p:style>
+          <a:lnRef idx="2">
+            <a:schemeClr val="accent1">
+              <a:shade val="50000"/>
+            </a:schemeClr>
+          </a:lnRef>
+          <a:fillRef idx="1">
+            <a:schemeClr val="accent1"/>
+          </a:fillRef>
+          <a:effectRef idx="0">
+            <a:schemeClr val="accent1"/>
+          </a:effectRef>
+          <a:fontRef idx="minor">
+            <a:schemeClr val="lt1"/>
+          </a:fontRef>
+        </p:style>
+        <p:txBody>
+          <a:bodyPr rtlCol="0" anchor="ctr"/>
+          <a:lstStyle/>
+          <a:p>
+            <a:pPr algn="ctr"/>
+            <a:endParaRPr lang="en-SG"/>
+          </a:p>
+        </p:txBody>
+      </p:sp>
+      <p:sp>
+        <p:nvSpPr>
+          <p:cNvPr id="116" name="Freeform 115"/>
+          <p:cNvSpPr/>
+          <p:nvPr/>
+        </p:nvSpPr>
+        <p:spPr>
+          <a:xfrm>
+            <a:off x="3687515" y="2844800"/>
+            <a:ext cx="3048000" cy="203200"/>
+          </a:xfrm>
+          <a:custGeom>
+            <a:avLst/>
+            <a:gdLst>
+              <a:gd name="connsiteX0" fmla="*/ 0 w 3048000"/>
+              <a:gd name="connsiteY0" fmla="*/ 203200 h 203200"/>
+              <a:gd name="connsiteX1" fmla="*/ 221673 w 3048000"/>
+              <a:gd name="connsiteY1" fmla="*/ 0 h 203200"/>
+              <a:gd name="connsiteX2" fmla="*/ 3048000 w 3048000"/>
+              <a:gd name="connsiteY2" fmla="*/ 0 h 203200"/>
+            </a:gdLst>
+            <a:ahLst/>
+            <a:cxnLst>
+              <a:cxn ang="0">
+                <a:pos x="connsiteX0" y="connsiteY0"/>
+              </a:cxn>
+              <a:cxn ang="0">
+                <a:pos x="connsiteX1" y="connsiteY1"/>
+              </a:cxn>
+              <a:cxn ang="0">
+                <a:pos x="connsiteX2" y="connsiteY2"/>
+              </a:cxn>
+            </a:cxnLst>
+            <a:rect l="l" t="t" r="r" b="b"/>
+            <a:pathLst>
+              <a:path w="3048000" h="203200">
+                <a:moveTo>
+                  <a:pt x="0" y="203200"/>
+                </a:moveTo>
+                <a:lnTo>
+                  <a:pt x="221673" y="0"/>
+                </a:lnTo>
+                <a:lnTo>
+                  <a:pt x="3048000" y="0"/>
+                </a:lnTo>
+              </a:path>
+            </a:pathLst>
+          </a:custGeom>
+          <a:noFill/>
+          <a:ln w="19050">
+            <a:solidFill>
+              <a:schemeClr val="accent3"/>
+            </a:solidFill>
+            <a:prstDash val="solid"/>
+            <a:headEnd type="none" w="med" len="med"/>
+            <a:tailEnd type="arrow" w="med" len="med"/>
+          </a:ln>
+          <a:effectLst/>
+        </p:spPr>
+        <p:style>
+          <a:lnRef idx="1">
+            <a:schemeClr val="accent2"/>
+          </a:lnRef>
+          <a:fillRef idx="2">
+            <a:schemeClr val="accent2"/>
+          </a:fillRef>
+          <a:effectRef idx="1">
+            <a:schemeClr val="accent2"/>
+          </a:effectRef>
+          <a:fontRef idx="minor">
+            <a:schemeClr val="dk1"/>
+          </a:fontRef>
+        </p:style>
+        <p:txBody>
+          <a:bodyPr rtlCol="0" anchor="ctr"/>
+          <a:lstStyle/>
+          <a:p>
+            <a:pPr algn="ctr"/>
+            <a:endParaRPr lang="en-SG"/>
+          </a:p>
+        </p:txBody>
+      </p:sp>
+      <p:sp>
+        <p:nvSpPr>
+          <p:cNvPr id="144" name="Rectangle 143"/>
+          <p:cNvSpPr/>
+          <p:nvPr/>
+        </p:nvSpPr>
+        <p:spPr>
+          <a:xfrm>
+            <a:off x="5431573" y="4488138"/>
+            <a:ext cx="229325" cy="160062"/>
+          </a:xfrm>
+          <a:prstGeom prst="rect">
+            <a:avLst/>
+          </a:prstGeom>
+          <a:solidFill>
+            <a:schemeClr val="accent3">
+              <a:lumMod val="20000"/>
+              <a:lumOff val="80000"/>
+              <a:alpha val="80000"/>
+            </a:schemeClr>
+          </a:solidFill>
+          <a:ln>
+            <a:noFill/>
+          </a:ln>
+          <a:effectLst>
+            <a:softEdge rad="31750"/>
+          </a:effectLst>
+        </p:spPr>
+        <p:style>
+          <a:lnRef idx="2">
+            <a:schemeClr val="accent1">
+              <a:shade val="50000"/>
+            </a:schemeClr>
+          </a:lnRef>
+          <a:fillRef idx="1">
+            <a:schemeClr val="accent1"/>
+          </a:fillRef>
+          <a:effectRef idx="0">
+            <a:schemeClr val="accent1"/>
+          </a:effectRef>
+          <a:fontRef idx="minor">
+            <a:schemeClr val="lt1"/>
+          </a:fontRef>
+        </p:style>
+        <p:txBody>
+          <a:bodyPr rtlCol="0" anchor="ctr"/>
+          <a:lstStyle/>
+          <a:p>
+            <a:pPr algn="ctr"/>
+            <a:endParaRPr lang="en-SG"/>
+          </a:p>
+        </p:txBody>
+      </p:sp>
+      <p:sp>
+        <p:nvSpPr>
+          <p:cNvPr id="118" name="Freeform 117"/>
+          <p:cNvSpPr/>
+          <p:nvPr/>
+        </p:nvSpPr>
+        <p:spPr>
           <a:xfrm flipV="1">
-            <a:off x="1060760" y="1152902"/>
-            <a:ext cx="270504" cy="175523"/>
+            <a:off x="4110475" y="4028916"/>
+            <a:ext cx="2642195" cy="101600"/>
           </a:xfrm>
-          <a:prstGeom prst="triangle">
+          <a:custGeom>
+            <a:avLst/>
+            <a:gdLst>
+              <a:gd name="connsiteX0" fmla="*/ 0 w 3048000"/>
+              <a:gd name="connsiteY0" fmla="*/ 203200 h 203200"/>
+              <a:gd name="connsiteX1" fmla="*/ 221673 w 3048000"/>
+              <a:gd name="connsiteY1" fmla="*/ 0 h 203200"/>
+              <a:gd name="connsiteX2" fmla="*/ 3048000 w 3048000"/>
+              <a:gd name="connsiteY2" fmla="*/ 0 h 203200"/>
+            </a:gdLst>
+            <a:ahLst/>
+            <a:cxnLst>
+              <a:cxn ang="0">
+                <a:pos x="connsiteX0" y="connsiteY0"/>
+              </a:cxn>
+              <a:cxn ang="0">
+                <a:pos x="connsiteX1" y="connsiteY1"/>
+              </a:cxn>
+              <a:cxn ang="0">
+                <a:pos x="connsiteX2" y="connsiteY2"/>
+              </a:cxn>
+            </a:cxnLst>
+            <a:rect l="l" t="t" r="r" b="b"/>
+            <a:pathLst>
+              <a:path w="3048000" h="203200">
+                <a:moveTo>
+                  <a:pt x="0" y="203200"/>
+                </a:moveTo>
+                <a:lnTo>
+                  <a:pt x="221673" y="0"/>
+                </a:lnTo>
+                <a:lnTo>
+                  <a:pt x="3048000" y="0"/>
+                </a:lnTo>
+              </a:path>
+            </a:pathLst>
+          </a:custGeom>
+          <a:noFill/>
+          <a:ln w="19050">
+            <a:solidFill>
+              <a:schemeClr val="accent3"/>
+            </a:solidFill>
+            <a:prstDash val="sysDot"/>
+            <a:headEnd type="none" w="med" len="med"/>
+            <a:tailEnd type="arrow" w="med" len="med"/>
+          </a:ln>
+          <a:effectLst/>
+        </p:spPr>
+        <p:style>
+          <a:lnRef idx="1">
+            <a:schemeClr val="accent2"/>
+          </a:lnRef>
+          <a:fillRef idx="2">
+            <a:schemeClr val="accent2"/>
+          </a:fillRef>
+          <a:effectRef idx="1">
+            <a:schemeClr val="accent2"/>
+          </a:effectRef>
+          <a:fontRef idx="minor">
+            <a:schemeClr val="dk1"/>
+          </a:fontRef>
+        </p:style>
+        <p:txBody>
+          <a:bodyPr rtlCol="0" anchor="ctr"/>
+          <a:lstStyle/>
+          <a:p>
+            <a:pPr algn="ctr"/>
+            <a:endParaRPr lang="en-SG"/>
+          </a:p>
+        </p:txBody>
+      </p:sp>
+      <p:sp>
+        <p:nvSpPr>
+          <p:cNvPr id="48" name="Rectangle 11">
+            <a:extLst>
+              <a:ext uri="{FF2B5EF4-FFF2-40B4-BE49-F238E27FC236}">
+                <a16:creationId xmlns:a16="http://schemas.microsoft.com/office/drawing/2014/main" id="{CFABF241-949E-6342-BD0A-DB5A705BA00E}"/>
+              </a:ext>
+            </a:extLst>
+          </p:cNvPr>
+          <p:cNvSpPr/>
+          <p:nvPr/>
+        </p:nvSpPr>
+        <p:spPr>
+          <a:xfrm>
+            <a:off x="3618649" y="3331819"/>
+            <a:ext cx="1040906" cy="236841"/>
+          </a:xfrm>
+          <a:prstGeom prst="rect">
             <a:avLst/>
           </a:prstGeom>
           <a:ln w="19050">
             <a:solidFill>
-              <a:srgbClr val="00B050"/>
+              <a:schemeClr val="accent3"/>
             </a:solidFill>
           </a:ln>
           <a:effectLst/>
@@ -4115,9 +4359,21 @@
           <a:lstStyle/>
           <a:p>
             <a:pPr algn="ctr"/>
-            <a:endParaRPr lang="en-SG" sz="1050" b="1">
+            <a:r>
+              <a:rPr lang="en-US" sz="1050" b="1" dirty="0" err="1">
+                <a:solidFill>
+                  <a:schemeClr val="accent3">
+                    <a:lumMod val="75000"/>
+                  </a:schemeClr>
+                </a:solidFill>
+              </a:rPr>
+              <a:t>MonthVew</a:t>
+            </a:r>
+            <a:endParaRPr lang="en-SG" sz="1050" b="1" dirty="0">
               <a:solidFill>
-                <a:srgbClr val="92D050"/>
+                <a:schemeClr val="accent3">
+                  <a:lumMod val="75000"/>
+                </a:schemeClr>
               </a:solidFill>
             </a:endParaRPr>
           </a:p>
@@ -4125,28 +4381,34 @@
       </p:sp>
       <p:cxnSp>
         <p:nvCxnSpPr>
-          <p:cNvPr id="121" name="Elbow Connector 63"/>
+          <p:cNvPr id="21" name="Elbow Connector 20">
+            <a:extLst>
+              <a:ext uri="{FF2B5EF4-FFF2-40B4-BE49-F238E27FC236}">
+                <a16:creationId xmlns:a16="http://schemas.microsoft.com/office/drawing/2014/main" id="{BF30A2DC-EA5F-0C47-BA59-81524BFACDC5}"/>
+              </a:ext>
+            </a:extLst>
+          </p:cNvPr>
           <p:cNvCxnSpPr>
-            <a:stCxn id="9" idx="1"/>
-            <a:endCxn id="120" idx="3"/>
+            <a:cxnSpLocks/>
+            <a:stCxn id="34" idx="2"/>
+            <a:endCxn id="48" idx="1"/>
           </p:cNvCxnSpPr>
           <p:nvPr/>
         </p:nvCxnSpPr>
         <p:spPr>
-          <a:xfrm rot="10800000" flipV="1">
-            <a:off x="1196012" y="782980"/>
-            <a:ext cx="896830" cy="369922"/>
+          <a:xfrm rot="16200000" flipH="1">
+            <a:off x="3246909" y="3078500"/>
+            <a:ext cx="254020" cy="489460"/>
           </a:xfrm>
           <a:prstGeom prst="bentConnector2">
             <a:avLst/>
           </a:prstGeom>
           <a:ln w="19050">
             <a:solidFill>
-              <a:srgbClr val="00B050"/>
+              <a:schemeClr val="accent3"/>
             </a:solidFill>
-            <a:prstDash val="sysDot"/>
             <a:headEnd type="none" w="med" len="med"/>
-            <a:tailEnd type="none" w="med" len="med"/>
+            <a:tailEnd type="arrow" w="med" len="med"/>
           </a:ln>
           <a:effectLst/>
         </p:spPr>
@@ -4165,1361 +4427,91 @@
           </a:fontRef>
         </p:style>
       </p:cxnSp>
-      <p:grpSp>
-        <p:nvGrpSpPr>
-          <p:cNvPr id="4" name="Group 3">
+      <p:sp>
+        <p:nvSpPr>
+          <p:cNvPr id="61" name="Rectangle 11">
             <a:extLst>
               <a:ext uri="{FF2B5EF4-FFF2-40B4-BE49-F238E27FC236}">
-                <a16:creationId xmlns:a16="http://schemas.microsoft.com/office/drawing/2014/main" id="{236C0383-B8A9-FB48-A539-1412C4656104}"/>
+                <a16:creationId xmlns:a16="http://schemas.microsoft.com/office/drawing/2014/main" id="{A980FB37-6D7E-674C-9696-4F188EAA2AB8}"/>
               </a:ext>
             </a:extLst>
           </p:cNvPr>
-          <p:cNvGrpSpPr/>
+          <p:cNvSpPr/>
           <p:nvPr/>
-        </p:nvGrpSpPr>
-        <p:grpSpPr>
+        </p:nvSpPr>
+        <p:spPr>
           <a:xfrm>
-            <a:off x="1737875" y="3429000"/>
-            <a:ext cx="1816295" cy="702175"/>
-            <a:chOff x="2078046" y="3771635"/>
-            <a:chExt cx="1579554" cy="702175"/>
+            <a:off x="3633433" y="3797579"/>
+            <a:ext cx="1040906" cy="236841"/>
           </a:xfrm>
-        </p:grpSpPr>
-        <p:sp>
-          <p:nvSpPr>
-            <p:cNvPr id="46" name="Rectangle 11">
-              <a:extLst>
-                <a:ext uri="{FF2B5EF4-FFF2-40B4-BE49-F238E27FC236}">
-                  <a16:creationId xmlns:a16="http://schemas.microsoft.com/office/drawing/2014/main" id="{B9DFE590-8F8C-8441-AE69-2F7364CFBD32}"/>
-                </a:ext>
-              </a:extLst>
-            </p:cNvPr>
-            <p:cNvSpPr/>
-            <p:nvPr/>
-          </p:nvSpPr>
-          <p:spPr>
-            <a:xfrm>
-              <a:off x="2078046" y="3771635"/>
-              <a:ext cx="1579554" cy="236841"/>
-            </a:xfrm>
-            <a:prstGeom prst="rect">
-              <a:avLst/>
-            </a:prstGeom>
-            <a:ln w="19050">
-              <a:solidFill>
-                <a:schemeClr val="accent3"/>
-              </a:solidFill>
-            </a:ln>
-            <a:effectLst/>
-          </p:spPr>
-          <p:style>
-            <a:lnRef idx="1">
+          <a:prstGeom prst="rect">
+            <a:avLst/>
+          </a:prstGeom>
+          <a:ln w="19050">
+            <a:solidFill>
               <a:schemeClr val="accent3"/>
-            </a:lnRef>
-            <a:fillRef idx="2">
-              <a:schemeClr val="accent3"/>
-            </a:fillRef>
-            <a:effectRef idx="1">
-              <a:schemeClr val="accent3"/>
-            </a:effectRef>
-            <a:fontRef idx="minor">
-              <a:schemeClr val="dk1"/>
-            </a:fontRef>
-          </p:style>
-          <p:txBody>
-            <a:bodyPr rtlCol="0" anchor="ctr"/>
-            <a:lstStyle/>
-            <a:p>
-              <a:pPr algn="ctr"/>
-              <a:r>
-                <a:rPr lang="en-US" sz="1050" b="1" dirty="0">
-                  <a:solidFill>
-                    <a:schemeClr val="accent3">
-                      <a:lumMod val="75000"/>
-                    </a:schemeClr>
-                  </a:solidFill>
-                </a:rPr>
-                <a:t>Calendar</a:t>
-              </a:r>
-              <a:endParaRPr lang="en-SG" sz="1050" b="1" dirty="0">
+            </a:solidFill>
+          </a:ln>
+          <a:effectLst/>
+        </p:spPr>
+        <p:style>
+          <a:lnRef idx="1">
+            <a:schemeClr val="accent3"/>
+          </a:lnRef>
+          <a:fillRef idx="2">
+            <a:schemeClr val="accent3"/>
+          </a:fillRef>
+          <a:effectRef idx="1">
+            <a:schemeClr val="accent3"/>
+          </a:effectRef>
+          <a:fontRef idx="minor">
+            <a:schemeClr val="dk1"/>
+          </a:fontRef>
+        </p:style>
+        <p:txBody>
+          <a:bodyPr rtlCol="0" anchor="ctr"/>
+          <a:lstStyle/>
+          <a:p>
+            <a:pPr algn="ctr"/>
+            <a:r>
+              <a:rPr lang="en-US" sz="1050" b="1" dirty="0" err="1">
                 <a:solidFill>
                   <a:schemeClr val="accent3">
                     <a:lumMod val="75000"/>
                   </a:schemeClr>
                 </a:solidFill>
-              </a:endParaRPr>
-            </a:p>
-          </p:txBody>
-        </p:sp>
-        <p:sp>
-          <p:nvSpPr>
-            <p:cNvPr id="48" name="Rectangle 11">
-              <a:extLst>
-                <a:ext uri="{FF2B5EF4-FFF2-40B4-BE49-F238E27FC236}">
-                  <a16:creationId xmlns:a16="http://schemas.microsoft.com/office/drawing/2014/main" id="{3C0ADE0C-55AC-1449-8FED-615CD7FFBE36}"/>
-                </a:ext>
-              </a:extLst>
-            </p:cNvPr>
-            <p:cNvSpPr/>
-            <p:nvPr/>
-          </p:nvSpPr>
-          <p:spPr>
-            <a:xfrm>
-              <a:off x="2078046" y="4236969"/>
-              <a:ext cx="1579554" cy="236841"/>
-            </a:xfrm>
-            <a:prstGeom prst="rect">
-              <a:avLst/>
-            </a:prstGeom>
-            <a:ln w="19050">
+              </a:rPr>
+              <a:t>EntryCard</a:t>
+            </a:r>
+            <a:endParaRPr lang="en-SG" sz="1050" b="1" dirty="0">
               <a:solidFill>
-                <a:schemeClr val="accent3"/>
+                <a:schemeClr val="accent3">
+                  <a:lumMod val="75000"/>
+                </a:schemeClr>
               </a:solidFill>
-            </a:ln>
-            <a:effectLst/>
-          </p:spPr>
-          <p:style>
-            <a:lnRef idx="1">
-              <a:schemeClr val="accent3"/>
-            </a:lnRef>
-            <a:fillRef idx="2">
-              <a:schemeClr val="accent3"/>
-            </a:fillRef>
-            <a:effectRef idx="1">
-              <a:schemeClr val="accent3"/>
-            </a:effectRef>
-            <a:fontRef idx="minor">
-              <a:schemeClr val="dk1"/>
-            </a:fontRef>
-          </p:style>
-          <p:txBody>
-            <a:bodyPr rtlCol="0" anchor="ctr"/>
-            <a:lstStyle/>
-            <a:p>
-              <a:r>
-                <a:rPr lang="en-US" sz="900" b="1" dirty="0">
-                  <a:solidFill>
-                    <a:schemeClr val="accent3">
-                      <a:lumMod val="75000"/>
-                    </a:schemeClr>
-                  </a:solidFill>
-                </a:rPr>
-                <a:t># </a:t>
-              </a:r>
-              <a:r>
-                <a:rPr lang="en-US" sz="900" b="1" dirty="0" err="1">
-                  <a:solidFill>
-                    <a:schemeClr val="accent3">
-                      <a:lumMod val="75000"/>
-                    </a:schemeClr>
-                  </a:solidFill>
-                </a:rPr>
-                <a:t>getCurrentMonth</a:t>
-              </a:r>
-              <a:r>
-                <a:rPr lang="en-US" sz="900" b="1" dirty="0">
-                  <a:solidFill>
-                    <a:schemeClr val="accent3">
-                      <a:lumMod val="75000"/>
-                    </a:schemeClr>
-                  </a:solidFill>
-                </a:rPr>
-                <a:t>()</a:t>
-              </a:r>
-              <a:endParaRPr lang="en-SG" sz="900" b="1" dirty="0">
-                <a:solidFill>
-                  <a:schemeClr val="accent3">
-                    <a:lumMod val="75000"/>
-                  </a:schemeClr>
-                </a:solidFill>
-              </a:endParaRPr>
-            </a:p>
-          </p:txBody>
-        </p:sp>
-        <p:sp>
-          <p:nvSpPr>
-            <p:cNvPr id="21" name="Rectangle 11">
-              <a:extLst>
-                <a:ext uri="{FF2B5EF4-FFF2-40B4-BE49-F238E27FC236}">
-                  <a16:creationId xmlns:a16="http://schemas.microsoft.com/office/drawing/2014/main" id="{A3D0FB2A-7150-4644-93CD-D9508411686D}"/>
-                </a:ext>
-              </a:extLst>
-            </p:cNvPr>
-            <p:cNvSpPr/>
-            <p:nvPr/>
-          </p:nvSpPr>
-          <p:spPr>
-            <a:xfrm>
-              <a:off x="2078046" y="4000128"/>
-              <a:ext cx="1579554" cy="236841"/>
-            </a:xfrm>
-            <a:prstGeom prst="rect">
-              <a:avLst/>
-            </a:prstGeom>
-            <a:ln w="19050">
-              <a:solidFill>
-                <a:schemeClr val="accent3"/>
-              </a:solidFill>
-            </a:ln>
-            <a:effectLst/>
-          </p:spPr>
-          <p:style>
-            <a:lnRef idx="1">
-              <a:schemeClr val="accent3"/>
-            </a:lnRef>
-            <a:fillRef idx="2">
-              <a:schemeClr val="accent3"/>
-            </a:fillRef>
-            <a:effectRef idx="1">
-              <a:schemeClr val="accent3"/>
-            </a:effectRef>
-            <a:fontRef idx="minor">
-              <a:schemeClr val="dk1"/>
-            </a:fontRef>
-          </p:style>
-          <p:txBody>
-            <a:bodyPr rtlCol="0" anchor="ctr"/>
-            <a:lstStyle/>
-            <a:p>
-              <a:r>
-                <a:rPr lang="en-US" sz="900" b="1" dirty="0">
-                  <a:solidFill>
-                    <a:schemeClr val="accent3">
-                      <a:lumMod val="75000"/>
-                    </a:schemeClr>
-                  </a:solidFill>
-                </a:rPr>
-                <a:t>- </a:t>
-              </a:r>
-              <a:r>
-                <a:rPr lang="en-US" sz="900" b="1" dirty="0" err="1">
-                  <a:solidFill>
-                    <a:schemeClr val="accent3">
-                      <a:lumMod val="75000"/>
-                    </a:schemeClr>
-                  </a:solidFill>
-                </a:rPr>
-                <a:t>monthView</a:t>
-              </a:r>
-              <a:r>
-                <a:rPr lang="en-US" sz="900" b="1" dirty="0">
-                  <a:solidFill>
-                    <a:schemeClr val="accent3">
-                      <a:lumMod val="75000"/>
-                    </a:schemeClr>
-                  </a:solidFill>
-                </a:rPr>
-                <a:t>: </a:t>
-              </a:r>
-              <a:r>
-                <a:rPr lang="en-US" sz="900" b="1" dirty="0" err="1">
-                  <a:solidFill>
-                    <a:schemeClr val="accent3">
-                      <a:lumMod val="75000"/>
-                    </a:schemeClr>
-                  </a:solidFill>
-                </a:rPr>
-                <a:t>MonthView</a:t>
-              </a:r>
-              <a:endParaRPr lang="en-SG" sz="900" b="1" dirty="0">
-                <a:solidFill>
-                  <a:schemeClr val="accent3">
-                    <a:lumMod val="75000"/>
-                  </a:schemeClr>
-                </a:solidFill>
-              </a:endParaRPr>
-            </a:p>
-          </p:txBody>
-        </p:sp>
-      </p:grpSp>
-      <p:grpSp>
-        <p:nvGrpSpPr>
-          <p:cNvPr id="12" name="Group 11">
+            </a:endParaRPr>
+          </a:p>
+        </p:txBody>
+      </p:sp>
+      <p:cxnSp>
+        <p:nvCxnSpPr>
+          <p:cNvPr id="28" name="Straight Arrow Connector 27">
             <a:extLst>
               <a:ext uri="{FF2B5EF4-FFF2-40B4-BE49-F238E27FC236}">
-                <a16:creationId xmlns:a16="http://schemas.microsoft.com/office/drawing/2014/main" id="{58431402-12D1-D045-BFEA-B9B7E300920B}"/>
-              </a:ext>
-            </a:extLst>
-          </p:cNvPr>
-          <p:cNvGrpSpPr/>
-          <p:nvPr/>
-        </p:nvGrpSpPr>
-        <p:grpSpPr>
-          <a:xfrm>
-            <a:off x="1164378" y="4495800"/>
-            <a:ext cx="2963288" cy="1799313"/>
-            <a:chOff x="4085665" y="3763287"/>
-            <a:chExt cx="2963288" cy="1799313"/>
-          </a:xfrm>
-        </p:grpSpPr>
-        <p:sp>
-          <p:nvSpPr>
-            <p:cNvPr id="23" name="Rectangle 11">
-              <a:extLst>
-                <a:ext uri="{FF2B5EF4-FFF2-40B4-BE49-F238E27FC236}">
-                  <a16:creationId xmlns:a16="http://schemas.microsoft.com/office/drawing/2014/main" id="{918310AC-9AA6-5341-A5C4-123994D52CDA}"/>
-                </a:ext>
-              </a:extLst>
-            </p:cNvPr>
-            <p:cNvSpPr/>
-            <p:nvPr/>
-          </p:nvSpPr>
-          <p:spPr>
-            <a:xfrm>
-              <a:off x="4085667" y="3763287"/>
-              <a:ext cx="2963286" cy="236841"/>
-            </a:xfrm>
-            <a:prstGeom prst="rect">
-              <a:avLst/>
-            </a:prstGeom>
-            <a:ln w="19050">
-              <a:solidFill>
-                <a:schemeClr val="accent3"/>
-              </a:solidFill>
-            </a:ln>
-            <a:effectLst/>
-          </p:spPr>
-          <p:style>
-            <a:lnRef idx="1">
-              <a:schemeClr val="accent3"/>
-            </a:lnRef>
-            <a:fillRef idx="2">
-              <a:schemeClr val="accent3"/>
-            </a:fillRef>
-            <a:effectRef idx="1">
-              <a:schemeClr val="accent3"/>
-            </a:effectRef>
-            <a:fontRef idx="minor">
-              <a:schemeClr val="dk1"/>
-            </a:fontRef>
-          </p:style>
-          <p:txBody>
-            <a:bodyPr rtlCol="0" anchor="ctr"/>
-            <a:lstStyle/>
-            <a:p>
-              <a:pPr algn="ctr"/>
-              <a:r>
-                <a:rPr lang="en-US" sz="1050" b="1" dirty="0" err="1">
-                  <a:solidFill>
-                    <a:schemeClr val="accent3">
-                      <a:lumMod val="75000"/>
-                    </a:schemeClr>
-                  </a:solidFill>
-                </a:rPr>
-                <a:t>MonthView</a:t>
-              </a:r>
-              <a:endParaRPr lang="en-SG" sz="1050" b="1" dirty="0">
-                <a:solidFill>
-                  <a:schemeClr val="accent3">
-                    <a:lumMod val="75000"/>
-                  </a:schemeClr>
-                </a:solidFill>
-              </a:endParaRPr>
-            </a:p>
-          </p:txBody>
-        </p:sp>
-        <p:sp>
-          <p:nvSpPr>
-            <p:cNvPr id="24" name="Rectangle 11">
-              <a:extLst>
-                <a:ext uri="{FF2B5EF4-FFF2-40B4-BE49-F238E27FC236}">
-                  <a16:creationId xmlns:a16="http://schemas.microsoft.com/office/drawing/2014/main" id="{D0920699-5050-914E-8A50-4E84C784192B}"/>
-                </a:ext>
-              </a:extLst>
-            </p:cNvPr>
-            <p:cNvSpPr/>
-            <p:nvPr/>
-          </p:nvSpPr>
-          <p:spPr>
-            <a:xfrm>
-              <a:off x="4085667" y="4000128"/>
-              <a:ext cx="2963286" cy="414272"/>
-            </a:xfrm>
-            <a:prstGeom prst="rect">
-              <a:avLst/>
-            </a:prstGeom>
-            <a:ln w="19050">
-              <a:solidFill>
-                <a:schemeClr val="accent3"/>
-              </a:solidFill>
-            </a:ln>
-            <a:effectLst/>
-          </p:spPr>
-          <p:style>
-            <a:lnRef idx="1">
-              <a:schemeClr val="accent3"/>
-            </a:lnRef>
-            <a:fillRef idx="2">
-              <a:schemeClr val="accent3"/>
-            </a:fillRef>
-            <a:effectRef idx="1">
-              <a:schemeClr val="accent3"/>
-            </a:effectRef>
-            <a:fontRef idx="minor">
-              <a:schemeClr val="dk1"/>
-            </a:fontRef>
-          </p:style>
-          <p:txBody>
-            <a:bodyPr rtlCol="0" anchor="ctr"/>
-            <a:lstStyle/>
-            <a:p>
-              <a:r>
-                <a:rPr lang="en-US" sz="900" b="1" dirty="0">
-                  <a:solidFill>
-                    <a:schemeClr val="accent3">
-                      <a:lumMod val="75000"/>
-                    </a:schemeClr>
-                  </a:solidFill>
-                </a:rPr>
-                <a:t>- </a:t>
-              </a:r>
-              <a:r>
-                <a:rPr lang="en-US" sz="900" b="1" dirty="0" err="1">
-                  <a:solidFill>
-                    <a:schemeClr val="accent3">
-                      <a:lumMod val="75000"/>
-                    </a:schemeClr>
-                  </a:solidFill>
-                </a:rPr>
-                <a:t>dateCount</a:t>
-              </a:r>
-              <a:r>
-                <a:rPr lang="en-US" sz="900" b="1" dirty="0">
-                  <a:solidFill>
-                    <a:schemeClr val="accent3">
-                      <a:lumMod val="75000"/>
-                    </a:schemeClr>
-                  </a:solidFill>
-                </a:rPr>
-                <a:t>: </a:t>
-              </a:r>
-              <a:r>
-                <a:rPr lang="en-US" sz="900" b="1" dirty="0" err="1">
-                  <a:solidFill>
-                    <a:schemeClr val="accent3">
-                      <a:lumMod val="75000"/>
-                    </a:schemeClr>
-                  </a:solidFill>
-                </a:rPr>
-                <a:t>int</a:t>
-              </a:r>
-              <a:endParaRPr lang="en-US" sz="900" b="1" dirty="0">
-                <a:solidFill>
-                  <a:schemeClr val="accent3">
-                    <a:lumMod val="75000"/>
-                  </a:schemeClr>
-                </a:solidFill>
-              </a:endParaRPr>
-            </a:p>
-            <a:p>
-              <a:r>
-                <a:rPr lang="en-SG" sz="900" b="1" dirty="0">
-                  <a:solidFill>
-                    <a:schemeClr val="accent3">
-                      <a:lumMod val="75000"/>
-                    </a:schemeClr>
-                  </a:solidFill>
-                </a:rPr>
-                <a:t>- </a:t>
-              </a:r>
-              <a:r>
-                <a:rPr lang="en-SG" sz="900" b="1" dirty="0" err="1">
-                  <a:solidFill>
-                    <a:schemeClr val="accent3">
-                      <a:lumMod val="75000"/>
-                    </a:schemeClr>
-                  </a:solidFill>
-                </a:rPr>
-                <a:t>datesToBePrinted</a:t>
-              </a:r>
-              <a:r>
-                <a:rPr lang="en-SG" sz="900" b="1" dirty="0">
-                  <a:solidFill>
-                    <a:schemeClr val="accent3">
-                      <a:lumMod val="75000"/>
-                    </a:schemeClr>
-                  </a:solidFill>
-                </a:rPr>
-                <a:t>: String[]</a:t>
-              </a:r>
-            </a:p>
-          </p:txBody>
-        </p:sp>
-        <p:sp>
-          <p:nvSpPr>
-            <p:cNvPr id="25" name="Rectangle 11">
-              <a:extLst>
-                <a:ext uri="{FF2B5EF4-FFF2-40B4-BE49-F238E27FC236}">
-                  <a16:creationId xmlns:a16="http://schemas.microsoft.com/office/drawing/2014/main" id="{6A086B78-FADC-9B43-A2D6-EF75C7895AA1}"/>
-                </a:ext>
-              </a:extLst>
-            </p:cNvPr>
-            <p:cNvSpPr/>
-            <p:nvPr/>
-          </p:nvSpPr>
-          <p:spPr>
-            <a:xfrm>
-              <a:off x="4085665" y="4423385"/>
-              <a:ext cx="2963288" cy="1139215"/>
-            </a:xfrm>
-            <a:prstGeom prst="rect">
-              <a:avLst/>
-            </a:prstGeom>
-            <a:ln w="19050">
-              <a:solidFill>
-                <a:schemeClr val="accent3"/>
-              </a:solidFill>
-            </a:ln>
-            <a:effectLst/>
-          </p:spPr>
-          <p:style>
-            <a:lnRef idx="1">
-              <a:schemeClr val="accent3"/>
-            </a:lnRef>
-            <a:fillRef idx="2">
-              <a:schemeClr val="accent3"/>
-            </a:fillRef>
-            <a:effectRef idx="1">
-              <a:schemeClr val="accent3"/>
-            </a:effectRef>
-            <a:fontRef idx="minor">
-              <a:schemeClr val="dk1"/>
-            </a:fontRef>
-          </p:style>
-          <p:txBody>
-            <a:bodyPr rtlCol="0" anchor="ctr"/>
-            <a:lstStyle/>
-            <a:p>
-              <a:r>
-                <a:rPr lang="en-US" sz="900" b="1" dirty="0">
-                  <a:solidFill>
-                    <a:schemeClr val="accent3">
-                      <a:lumMod val="75000"/>
-                    </a:schemeClr>
-                  </a:solidFill>
-                </a:rPr>
-                <a:t># </a:t>
-              </a:r>
-              <a:r>
-                <a:rPr lang="en-US" sz="900" b="1" dirty="0" err="1">
-                  <a:solidFill>
-                    <a:schemeClr val="accent3">
-                      <a:lumMod val="75000"/>
-                    </a:schemeClr>
-                  </a:solidFill>
-                </a:rPr>
-                <a:t>setMonthCalendarTitle</a:t>
-              </a:r>
-              <a:r>
-                <a:rPr lang="en-US" sz="900" b="1" dirty="0">
-                  <a:solidFill>
-                    <a:schemeClr val="accent3">
-                      <a:lumMod val="75000"/>
-                    </a:schemeClr>
-                  </a:solidFill>
-                </a:rPr>
-                <a:t> (year: </a:t>
-              </a:r>
-              <a:r>
-                <a:rPr lang="en-US" sz="900" b="1" dirty="0" err="1">
-                  <a:solidFill>
-                    <a:schemeClr val="accent3">
-                      <a:lumMod val="75000"/>
-                    </a:schemeClr>
-                  </a:solidFill>
-                </a:rPr>
-                <a:t>int</a:t>
-              </a:r>
-              <a:r>
-                <a:rPr lang="en-US" sz="900" b="1" dirty="0">
-                  <a:solidFill>
-                    <a:schemeClr val="accent3">
-                      <a:lumMod val="75000"/>
-                    </a:schemeClr>
-                  </a:solidFill>
-                </a:rPr>
-                <a:t>, month: String)</a:t>
-              </a:r>
-            </a:p>
-            <a:p>
-              <a:r>
-                <a:rPr lang="en-US" sz="900" b="1" dirty="0">
-                  <a:solidFill>
-                    <a:schemeClr val="accent3">
-                      <a:lumMod val="75000"/>
-                    </a:schemeClr>
-                  </a:solidFill>
-                </a:rPr>
-                <a:t># </a:t>
-              </a:r>
-              <a:r>
-                <a:rPr lang="en-US" sz="900" b="1" dirty="0" err="1">
-                  <a:solidFill>
-                    <a:schemeClr val="accent3">
-                      <a:lumMod val="75000"/>
-                    </a:schemeClr>
-                  </a:solidFill>
-                </a:rPr>
-                <a:t>setMonthCalendarDates</a:t>
-              </a:r>
-              <a:r>
-                <a:rPr lang="en-US" sz="900" b="1" dirty="0">
-                  <a:solidFill>
-                    <a:schemeClr val="accent3">
-                      <a:lumMod val="75000"/>
-                    </a:schemeClr>
-                  </a:solidFill>
-                </a:rPr>
-                <a:t> (year: </a:t>
-              </a:r>
-              <a:r>
-                <a:rPr lang="en-US" sz="900" b="1" dirty="0" err="1">
-                  <a:solidFill>
-                    <a:schemeClr val="accent3">
-                      <a:lumMod val="75000"/>
-                    </a:schemeClr>
-                  </a:solidFill>
-                </a:rPr>
-                <a:t>int</a:t>
-              </a:r>
-              <a:r>
-                <a:rPr lang="en-US" sz="900" b="1" dirty="0">
-                  <a:solidFill>
-                    <a:schemeClr val="accent3">
-                      <a:lumMod val="75000"/>
-                    </a:schemeClr>
-                  </a:solidFill>
-                </a:rPr>
-                <a:t>, month: </a:t>
-              </a:r>
-              <a:r>
-                <a:rPr lang="en-US" sz="900" b="1" dirty="0" err="1">
-                  <a:solidFill>
-                    <a:schemeClr val="accent3">
-                      <a:lumMod val="75000"/>
-                    </a:schemeClr>
-                  </a:solidFill>
-                </a:rPr>
-                <a:t>int</a:t>
-              </a:r>
-              <a:r>
-                <a:rPr lang="en-US" sz="900" b="1" dirty="0">
-                  <a:solidFill>
-                    <a:schemeClr val="accent3">
-                      <a:lumMod val="75000"/>
-                    </a:schemeClr>
-                  </a:solidFill>
-                </a:rPr>
-                <a:t>)</a:t>
-              </a:r>
-            </a:p>
-            <a:p>
-              <a:r>
-                <a:rPr lang="en-US" sz="900" b="1" dirty="0">
-                  <a:solidFill>
-                    <a:schemeClr val="accent3">
-                      <a:lumMod val="75000"/>
-                    </a:schemeClr>
-                  </a:solidFill>
-                </a:rPr>
-                <a:t>- </a:t>
-              </a:r>
-              <a:r>
-                <a:rPr lang="en-US" sz="900" b="1" dirty="0" err="1">
-                  <a:solidFill>
-                    <a:schemeClr val="accent3">
-                      <a:lumMod val="75000"/>
-                    </a:schemeClr>
-                  </a:solidFill>
-                </a:rPr>
-                <a:t>setFiveWeeksMonthCalendar</a:t>
-              </a:r>
-              <a:r>
-                <a:rPr lang="en-US" sz="900" b="1" dirty="0">
-                  <a:solidFill>
-                    <a:schemeClr val="accent3">
-                      <a:lumMod val="75000"/>
-                    </a:schemeClr>
-                  </a:solidFill>
-                </a:rPr>
-                <a:t> (</a:t>
-              </a:r>
-              <a:r>
-                <a:rPr lang="en-US" sz="900" b="1" dirty="0" err="1">
-                  <a:solidFill>
-                    <a:schemeClr val="accent3">
-                      <a:lumMod val="75000"/>
-                    </a:schemeClr>
-                  </a:solidFill>
-                </a:rPr>
-                <a:t>startDay</a:t>
-              </a:r>
-              <a:r>
-                <a:rPr lang="en-US" sz="900" b="1" dirty="0">
-                  <a:solidFill>
-                    <a:schemeClr val="accent3">
-                      <a:lumMod val="75000"/>
-                    </a:schemeClr>
-                  </a:solidFill>
-                </a:rPr>
-                <a:t>: </a:t>
-              </a:r>
-              <a:r>
-                <a:rPr lang="en-US" sz="900" b="1" dirty="0" err="1">
-                  <a:solidFill>
-                    <a:schemeClr val="accent3">
-                      <a:lumMod val="75000"/>
-                    </a:schemeClr>
-                  </a:solidFill>
-                </a:rPr>
-                <a:t>int</a:t>
-              </a:r>
-              <a:r>
-                <a:rPr lang="en-US" sz="900" b="1" dirty="0">
-                  <a:solidFill>
-                    <a:schemeClr val="accent3">
-                      <a:lumMod val="75000"/>
-                    </a:schemeClr>
-                  </a:solidFill>
-                </a:rPr>
-                <a:t>)</a:t>
-              </a:r>
-            </a:p>
-            <a:p>
-              <a:r>
-                <a:rPr lang="en-SG" sz="900" b="1" dirty="0">
-                  <a:solidFill>
-                    <a:schemeClr val="accent3">
-                      <a:lumMod val="75000"/>
-                    </a:schemeClr>
-                  </a:solidFill>
-                </a:rPr>
-                <a:t>- </a:t>
-              </a:r>
-              <a:r>
-                <a:rPr lang="en-SG" sz="900" b="1" dirty="0" err="1">
-                  <a:solidFill>
-                    <a:schemeClr val="accent3">
-                      <a:lumMod val="75000"/>
-                    </a:schemeClr>
-                  </a:solidFill>
-                </a:rPr>
-                <a:t>setSixWeeksMonthCalendar</a:t>
-              </a:r>
-              <a:r>
-                <a:rPr lang="en-SG" sz="900" b="1" dirty="0">
-                  <a:solidFill>
-                    <a:schemeClr val="accent3">
-                      <a:lumMod val="75000"/>
-                    </a:schemeClr>
-                  </a:solidFill>
-                </a:rPr>
-                <a:t> (</a:t>
-              </a:r>
-              <a:r>
-                <a:rPr lang="en-SG" sz="900" b="1" dirty="0" err="1">
-                  <a:solidFill>
-                    <a:schemeClr val="accent3">
-                      <a:lumMod val="75000"/>
-                    </a:schemeClr>
-                  </a:solidFill>
-                </a:rPr>
-                <a:t>lengthOfMonth</a:t>
-              </a:r>
-              <a:r>
-                <a:rPr lang="en-SG" sz="900" b="1" dirty="0">
-                  <a:solidFill>
-                    <a:schemeClr val="accent3">
-                      <a:lumMod val="75000"/>
-                    </a:schemeClr>
-                  </a:solidFill>
-                </a:rPr>
-                <a:t>: </a:t>
-              </a:r>
-              <a:r>
-                <a:rPr lang="en-SG" sz="900" b="1" dirty="0" err="1">
-                  <a:solidFill>
-                    <a:schemeClr val="accent3">
-                      <a:lumMod val="75000"/>
-                    </a:schemeClr>
-                  </a:solidFill>
-                </a:rPr>
-                <a:t>int</a:t>
-              </a:r>
-              <a:r>
-                <a:rPr lang="en-SG" sz="900" b="1" dirty="0">
-                  <a:solidFill>
-                    <a:schemeClr val="accent3">
-                      <a:lumMod val="75000"/>
-                    </a:schemeClr>
-                  </a:solidFill>
-                </a:rPr>
-                <a:t>)</a:t>
-              </a:r>
-            </a:p>
-            <a:p>
-              <a:r>
-                <a:rPr lang="en-SG" sz="900" b="1" dirty="0">
-                  <a:solidFill>
-                    <a:schemeClr val="accent3">
-                      <a:lumMod val="75000"/>
-                    </a:schemeClr>
-                  </a:solidFill>
-                </a:rPr>
-                <a:t>- </a:t>
-              </a:r>
-              <a:r>
-                <a:rPr lang="en-SG" sz="900" b="1" dirty="0" err="1">
-                  <a:solidFill>
-                    <a:schemeClr val="accent3">
-                      <a:lumMod val="75000"/>
-                    </a:schemeClr>
-                  </a:solidFill>
-                </a:rPr>
-                <a:t>getMonthStartDay</a:t>
-              </a:r>
-              <a:r>
-                <a:rPr lang="en-SG" sz="900" b="1" dirty="0">
-                  <a:solidFill>
-                    <a:schemeClr val="accent3">
-                      <a:lumMod val="75000"/>
-                    </a:schemeClr>
-                  </a:solidFill>
-                </a:rPr>
-                <a:t> (</a:t>
-              </a:r>
-              <a:r>
-                <a:rPr lang="en-SG" sz="900" b="1" dirty="0" err="1">
-                  <a:solidFill>
-                    <a:schemeClr val="accent3">
-                      <a:lumMod val="75000"/>
-                    </a:schemeClr>
-                  </a:solidFill>
-                </a:rPr>
-                <a:t>startDate</a:t>
-              </a:r>
-              <a:r>
-                <a:rPr lang="en-SG" sz="900" b="1" dirty="0">
-                  <a:solidFill>
-                    <a:schemeClr val="accent3">
-                      <a:lumMod val="75000"/>
-                    </a:schemeClr>
-                  </a:solidFill>
-                </a:rPr>
-                <a:t>: </a:t>
-              </a:r>
-              <a:r>
-                <a:rPr lang="en-SG" sz="900" b="1" dirty="0" err="1">
-                  <a:solidFill>
-                    <a:schemeClr val="accent3">
-                      <a:lumMod val="75000"/>
-                    </a:schemeClr>
-                  </a:solidFill>
-                </a:rPr>
-                <a:t>LocalDate</a:t>
-              </a:r>
-              <a:r>
-                <a:rPr lang="en-SG" sz="900" b="1" dirty="0">
-                  <a:solidFill>
-                    <a:schemeClr val="accent3">
-                      <a:lumMod val="75000"/>
-                    </a:schemeClr>
-                  </a:solidFill>
-                </a:rPr>
-                <a:t>)</a:t>
-              </a:r>
-            </a:p>
-            <a:p>
-              <a:r>
-                <a:rPr lang="en-SG" sz="900" b="1" dirty="0">
-                  <a:solidFill>
-                    <a:schemeClr val="accent3">
-                      <a:lumMod val="75000"/>
-                    </a:schemeClr>
-                  </a:solidFill>
-                </a:rPr>
-                <a:t>- </a:t>
-              </a:r>
-              <a:r>
-                <a:rPr lang="en-SG" sz="900" b="1" dirty="0" err="1">
-                  <a:solidFill>
-                    <a:schemeClr val="accent3">
-                      <a:lumMod val="75000"/>
-                    </a:schemeClr>
-                  </a:solidFill>
-                </a:rPr>
-                <a:t>addMonthDate</a:t>
-              </a:r>
-              <a:r>
-                <a:rPr lang="en-SG" sz="900" b="1" dirty="0">
-                  <a:solidFill>
-                    <a:schemeClr val="accent3">
-                      <a:lumMod val="75000"/>
-                    </a:schemeClr>
-                  </a:solidFill>
-                </a:rPr>
-                <a:t> (</a:t>
-              </a:r>
-              <a:r>
-                <a:rPr lang="en-SG" sz="900" b="1" dirty="0" err="1">
-                  <a:solidFill>
-                    <a:schemeClr val="accent3">
-                      <a:lumMod val="75000"/>
-                    </a:schemeClr>
-                  </a:solidFill>
-                </a:rPr>
-                <a:t>dateToPrint</a:t>
-              </a:r>
-              <a:r>
-                <a:rPr lang="en-SG" sz="900" b="1" dirty="0">
-                  <a:solidFill>
-                    <a:schemeClr val="accent3">
-                      <a:lumMod val="75000"/>
-                    </a:schemeClr>
-                  </a:solidFill>
-                </a:rPr>
-                <a:t>: Text, column: </a:t>
-              </a:r>
-              <a:r>
-                <a:rPr lang="en-SG" sz="900" b="1" dirty="0" err="1">
-                  <a:solidFill>
-                    <a:schemeClr val="accent3">
-                      <a:lumMod val="75000"/>
-                    </a:schemeClr>
-                  </a:solidFill>
-                </a:rPr>
-                <a:t>int</a:t>
-              </a:r>
-              <a:r>
-                <a:rPr lang="en-SG" sz="900" b="1" dirty="0">
-                  <a:solidFill>
-                    <a:schemeClr val="accent3">
-                      <a:lumMod val="75000"/>
-                    </a:schemeClr>
-                  </a:solidFill>
-                </a:rPr>
-                <a:t>, row: </a:t>
-              </a:r>
-              <a:r>
-                <a:rPr lang="en-SG" sz="900" b="1" dirty="0" err="1">
-                  <a:solidFill>
-                    <a:schemeClr val="accent3">
-                      <a:lumMod val="75000"/>
-                    </a:schemeClr>
-                  </a:solidFill>
-                </a:rPr>
-                <a:t>int</a:t>
-              </a:r>
-              <a:r>
-                <a:rPr lang="en-SG" sz="900" b="1" dirty="0">
-                  <a:solidFill>
-                    <a:schemeClr val="accent3">
-                      <a:lumMod val="75000"/>
-                    </a:schemeClr>
-                  </a:solidFill>
-                </a:rPr>
-                <a:t>)</a:t>
-              </a:r>
-            </a:p>
-            <a:p>
-              <a:r>
-                <a:rPr lang="en-SG" sz="900" b="1" dirty="0">
-                  <a:solidFill>
-                    <a:schemeClr val="accent3">
-                      <a:lumMod val="75000"/>
-                    </a:schemeClr>
-                  </a:solidFill>
-                </a:rPr>
-                <a:t>- </a:t>
-              </a:r>
-              <a:r>
-                <a:rPr lang="en-SG" sz="900" b="1" dirty="0" err="1">
-                  <a:solidFill>
-                    <a:schemeClr val="accent3">
-                      <a:lumMod val="75000"/>
-                    </a:schemeClr>
-                  </a:solidFill>
-                </a:rPr>
-                <a:t>storeMonthDatesToBePrinted</a:t>
-              </a:r>
-              <a:r>
-                <a:rPr lang="en-SG" sz="900" b="1" dirty="0">
-                  <a:solidFill>
-                    <a:schemeClr val="accent3">
-                      <a:lumMod val="75000"/>
-                    </a:schemeClr>
-                  </a:solidFill>
-                </a:rPr>
-                <a:t>(</a:t>
-              </a:r>
-              <a:r>
-                <a:rPr lang="en-SG" sz="900" b="1" dirty="0" err="1">
-                  <a:solidFill>
-                    <a:schemeClr val="accent3">
-                      <a:lumMod val="75000"/>
-                    </a:schemeClr>
-                  </a:solidFill>
-                </a:rPr>
-                <a:t>lengthOfMonth</a:t>
-              </a:r>
-              <a:r>
-                <a:rPr lang="en-SG" sz="900" b="1" dirty="0">
-                  <a:solidFill>
-                    <a:schemeClr val="accent3">
-                      <a:lumMod val="75000"/>
-                    </a:schemeClr>
-                  </a:solidFill>
-                </a:rPr>
-                <a:t>: </a:t>
-              </a:r>
-              <a:r>
-                <a:rPr lang="en-SG" sz="900" b="1" dirty="0" err="1">
-                  <a:solidFill>
-                    <a:schemeClr val="accent3">
-                      <a:lumMod val="75000"/>
-                    </a:schemeClr>
-                  </a:solidFill>
-                </a:rPr>
-                <a:t>int</a:t>
-              </a:r>
-              <a:r>
-                <a:rPr lang="en-SG" sz="900" b="1" dirty="0">
-                  <a:solidFill>
-                    <a:schemeClr val="accent3">
-                      <a:lumMod val="75000"/>
-                    </a:schemeClr>
-                  </a:solidFill>
-                </a:rPr>
-                <a:t>)</a:t>
-              </a:r>
-              <a:endParaRPr lang="en-US" sz="900" b="1" dirty="0">
-                <a:solidFill>
-                  <a:schemeClr val="accent3">
-                    <a:lumMod val="75000"/>
-                  </a:schemeClr>
-                </a:solidFill>
-              </a:endParaRPr>
-            </a:p>
-          </p:txBody>
-        </p:sp>
-      </p:grpSp>
-      <p:grpSp>
-        <p:nvGrpSpPr>
-          <p:cNvPr id="8" name="Group 7">
-            <a:extLst>
-              <a:ext uri="{FF2B5EF4-FFF2-40B4-BE49-F238E27FC236}">
-                <a16:creationId xmlns:a16="http://schemas.microsoft.com/office/drawing/2014/main" id="{26FD4D57-2EFD-9D4C-AEB7-C8E7688466BB}"/>
-              </a:ext>
-            </a:extLst>
-          </p:cNvPr>
-          <p:cNvGrpSpPr/>
-          <p:nvPr/>
-        </p:nvGrpSpPr>
-        <p:grpSpPr>
-          <a:xfrm>
-            <a:off x="1749342" y="1981200"/>
-            <a:ext cx="1793360" cy="1018663"/>
-            <a:chOff x="2092840" y="3331491"/>
-            <a:chExt cx="1793360" cy="1018663"/>
-          </a:xfrm>
-        </p:grpSpPr>
-        <p:sp>
-          <p:nvSpPr>
-            <p:cNvPr id="34" name="Rectangle 11"/>
-            <p:cNvSpPr/>
-            <p:nvPr/>
-          </p:nvSpPr>
-          <p:spPr>
-            <a:xfrm>
-              <a:off x="2092840" y="3331491"/>
-              <a:ext cx="1793360" cy="236841"/>
-            </a:xfrm>
-            <a:prstGeom prst="rect">
-              <a:avLst/>
-            </a:prstGeom>
-            <a:ln w="19050">
-              <a:solidFill>
-                <a:schemeClr val="accent3"/>
-              </a:solidFill>
-            </a:ln>
-            <a:effectLst/>
-          </p:spPr>
-          <p:style>
-            <a:lnRef idx="1">
-              <a:schemeClr val="accent3"/>
-            </a:lnRef>
-            <a:fillRef idx="2">
-              <a:schemeClr val="accent3"/>
-            </a:fillRef>
-            <a:effectRef idx="1">
-              <a:schemeClr val="accent3"/>
-            </a:effectRef>
-            <a:fontRef idx="minor">
-              <a:schemeClr val="dk1"/>
-            </a:fontRef>
-          </p:style>
-          <p:txBody>
-            <a:bodyPr rtlCol="0" anchor="ctr"/>
-            <a:lstStyle/>
-            <a:p>
-              <a:pPr algn="ctr"/>
-              <a:r>
-                <a:rPr lang="en-US" sz="1050" b="1" dirty="0" err="1">
-                  <a:solidFill>
-                    <a:schemeClr val="accent3">
-                      <a:lumMod val="75000"/>
-                    </a:schemeClr>
-                  </a:solidFill>
-                </a:rPr>
-                <a:t>CalendarPanel</a:t>
-              </a:r>
-              <a:endParaRPr lang="en-SG" sz="1050" b="1" dirty="0">
-                <a:solidFill>
-                  <a:schemeClr val="accent3">
-                    <a:lumMod val="75000"/>
-                  </a:schemeClr>
-                </a:solidFill>
-              </a:endParaRPr>
-            </a:p>
-          </p:txBody>
-        </p:sp>
-        <p:sp>
-          <p:nvSpPr>
-            <p:cNvPr id="27" name="Rectangle 11">
-              <a:extLst>
-                <a:ext uri="{FF2B5EF4-FFF2-40B4-BE49-F238E27FC236}">
-                  <a16:creationId xmlns:a16="http://schemas.microsoft.com/office/drawing/2014/main" id="{8899F7F5-29A9-B840-BFFE-8D1F43FD7794}"/>
-                </a:ext>
-              </a:extLst>
-            </p:cNvPr>
-            <p:cNvSpPr/>
-            <p:nvPr/>
-          </p:nvSpPr>
-          <p:spPr>
-            <a:xfrm>
-              <a:off x="2092840" y="3568333"/>
-              <a:ext cx="1793360" cy="394136"/>
-            </a:xfrm>
-            <a:prstGeom prst="rect">
-              <a:avLst/>
-            </a:prstGeom>
-            <a:ln w="19050">
-              <a:solidFill>
-                <a:schemeClr val="accent3"/>
-              </a:solidFill>
-            </a:ln>
-            <a:effectLst/>
-          </p:spPr>
-          <p:style>
-            <a:lnRef idx="1">
-              <a:schemeClr val="accent3"/>
-            </a:lnRef>
-            <a:fillRef idx="2">
-              <a:schemeClr val="accent3"/>
-            </a:fillRef>
-            <a:effectRef idx="1">
-              <a:schemeClr val="accent3"/>
-            </a:effectRef>
-            <a:fontRef idx="minor">
-              <a:schemeClr val="dk1"/>
-            </a:fontRef>
-          </p:style>
-          <p:txBody>
-            <a:bodyPr rtlCol="0" anchor="ctr"/>
-            <a:lstStyle/>
-            <a:p>
-              <a:r>
-                <a:rPr lang="en-US" sz="900" b="1" dirty="0">
-                  <a:solidFill>
-                    <a:schemeClr val="accent3">
-                      <a:lumMod val="75000"/>
-                    </a:schemeClr>
-                  </a:solidFill>
-                </a:rPr>
-                <a:t>- calendar: Calendar</a:t>
-              </a:r>
-            </a:p>
-            <a:p>
-              <a:r>
-                <a:rPr lang="en-SG" sz="900" b="1" dirty="0">
-                  <a:solidFill>
-                    <a:schemeClr val="accent3">
-                      <a:lumMod val="75000"/>
-                    </a:schemeClr>
-                  </a:solidFill>
-                </a:rPr>
-                <a:t>- </a:t>
-              </a:r>
-              <a:r>
-                <a:rPr lang="en-SG" sz="900" b="1" dirty="0" err="1">
-                  <a:solidFill>
-                    <a:schemeClr val="accent3">
-                      <a:lumMod val="75000"/>
-                    </a:schemeClr>
-                  </a:solidFill>
-                </a:rPr>
-                <a:t>currentYearMonth</a:t>
-              </a:r>
-              <a:r>
-                <a:rPr lang="en-SG" sz="900" b="1" dirty="0">
-                  <a:solidFill>
-                    <a:schemeClr val="accent3">
-                      <a:lumMod val="75000"/>
-                    </a:schemeClr>
-                  </a:solidFill>
-                </a:rPr>
-                <a:t>: </a:t>
-              </a:r>
-              <a:r>
-                <a:rPr lang="en-SG" sz="900" b="1" dirty="0" err="1">
-                  <a:solidFill>
-                    <a:schemeClr val="accent3">
-                      <a:lumMod val="75000"/>
-                    </a:schemeClr>
-                  </a:solidFill>
-                </a:rPr>
-                <a:t>YearMonth</a:t>
-              </a:r>
-              <a:endParaRPr lang="en-SG" sz="900" b="1" dirty="0">
-                <a:solidFill>
-                  <a:schemeClr val="accent3">
-                    <a:lumMod val="75000"/>
-                  </a:schemeClr>
-                </a:solidFill>
-              </a:endParaRPr>
-            </a:p>
-          </p:txBody>
-        </p:sp>
-        <p:sp>
-          <p:nvSpPr>
-            <p:cNvPr id="28" name="Rectangle 11">
-              <a:extLst>
-                <a:ext uri="{FF2B5EF4-FFF2-40B4-BE49-F238E27FC236}">
-                  <a16:creationId xmlns:a16="http://schemas.microsoft.com/office/drawing/2014/main" id="{F707F967-525B-0F49-A515-5D7EA2350D5D}"/>
-                </a:ext>
-              </a:extLst>
-            </p:cNvPr>
-            <p:cNvSpPr/>
-            <p:nvPr/>
-          </p:nvSpPr>
-          <p:spPr>
-            <a:xfrm>
-              <a:off x="2092840" y="3956018"/>
-              <a:ext cx="1793360" cy="394136"/>
-            </a:xfrm>
-            <a:prstGeom prst="rect">
-              <a:avLst/>
-            </a:prstGeom>
-            <a:ln w="19050">
-              <a:solidFill>
-                <a:schemeClr val="accent3"/>
-              </a:solidFill>
-            </a:ln>
-            <a:effectLst/>
-          </p:spPr>
-          <p:style>
-            <a:lnRef idx="1">
-              <a:schemeClr val="accent3"/>
-            </a:lnRef>
-            <a:fillRef idx="2">
-              <a:schemeClr val="accent3"/>
-            </a:fillRef>
-            <a:effectRef idx="1">
-              <a:schemeClr val="accent3"/>
-            </a:effectRef>
-            <a:fontRef idx="minor">
-              <a:schemeClr val="dk1"/>
-            </a:fontRef>
-          </p:style>
-          <p:txBody>
-            <a:bodyPr rtlCol="0" anchor="ctr"/>
-            <a:lstStyle/>
-            <a:p>
-              <a:r>
-                <a:rPr lang="en-US" sz="900" b="1" dirty="0">
-                  <a:solidFill>
-                    <a:schemeClr val="accent3">
-                      <a:lumMod val="75000"/>
-                    </a:schemeClr>
-                  </a:solidFill>
-                </a:rPr>
-                <a:t>- </a:t>
-              </a:r>
-              <a:r>
-                <a:rPr lang="en-US" sz="900" b="1" dirty="0" err="1">
-                  <a:solidFill>
-                    <a:schemeClr val="accent3">
-                      <a:lumMod val="75000"/>
-                    </a:schemeClr>
-                  </a:solidFill>
-                </a:rPr>
-                <a:t>loadMainView</a:t>
-              </a:r>
-              <a:r>
-                <a:rPr lang="en-US" sz="900" b="1" dirty="0">
-                  <a:solidFill>
-                    <a:schemeClr val="accent3">
-                      <a:lumMod val="75000"/>
-                    </a:schemeClr>
-                  </a:solidFill>
-                </a:rPr>
-                <a:t>()</a:t>
-              </a:r>
-            </a:p>
-            <a:p>
-              <a:r>
-                <a:rPr lang="en-SG" sz="900" b="1" dirty="0">
-                  <a:solidFill>
-                    <a:schemeClr val="accent3">
-                      <a:lumMod val="75000"/>
-                    </a:schemeClr>
-                  </a:solidFill>
-                </a:rPr>
-                <a:t>- </a:t>
-              </a:r>
-              <a:r>
-                <a:rPr lang="en-SG" sz="900" b="1" dirty="0" err="1">
-                  <a:solidFill>
-                    <a:schemeClr val="accent3">
-                      <a:lumMod val="75000"/>
-                    </a:schemeClr>
-                  </a:solidFill>
-                </a:rPr>
-                <a:t>createMainView</a:t>
-              </a:r>
-              <a:r>
-                <a:rPr lang="en-SG" sz="900" b="1" dirty="0">
-                  <a:solidFill>
-                    <a:schemeClr val="accent3">
-                      <a:lumMod val="75000"/>
-                    </a:schemeClr>
-                  </a:solidFill>
-                </a:rPr>
-                <a:t>()</a:t>
-              </a:r>
-            </a:p>
-          </p:txBody>
-        </p:sp>
-      </p:grpSp>
-      <p:cxnSp>
-        <p:nvCxnSpPr>
-          <p:cNvPr id="15" name="Straight Arrow Connector 14">
-            <a:extLst>
-              <a:ext uri="{FF2B5EF4-FFF2-40B4-BE49-F238E27FC236}">
-                <a16:creationId xmlns:a16="http://schemas.microsoft.com/office/drawing/2014/main" id="{C25D3416-4A23-E74E-A155-95E716B70A49}"/>
+                <a16:creationId xmlns:a16="http://schemas.microsoft.com/office/drawing/2014/main" id="{62C2F2B6-28F6-AC41-B517-97AF1F9BC2F5}"/>
               </a:ext>
             </a:extLst>
           </p:cNvPr>
           <p:cNvCxnSpPr>
-            <a:stCxn id="28" idx="2"/>
-            <a:endCxn id="46" idx="0"/>
+            <a:stCxn id="48" idx="2"/>
+            <a:endCxn id="61" idx="0"/>
           </p:cNvCxnSpPr>
           <p:nvPr/>
         </p:nvCxnSpPr>
         <p:spPr>
           <a:xfrm>
-            <a:off x="2646022" y="2999863"/>
-            <a:ext cx="1" cy="429137"/>
+            <a:off x="4139102" y="3568660"/>
+            <a:ext cx="14784" cy="228919"/>
           </a:xfrm>
           <a:prstGeom prst="straightConnector1">
             <a:avLst/>
@@ -5550,33 +4542,34 @@
       </p:cxnSp>
       <p:cxnSp>
         <p:nvCxnSpPr>
-          <p:cNvPr id="30" name="Straight Arrow Connector 29">
+          <p:cNvPr id="32" name="Elbow Connector 31">
             <a:extLst>
               <a:ext uri="{FF2B5EF4-FFF2-40B4-BE49-F238E27FC236}">
-                <a16:creationId xmlns:a16="http://schemas.microsoft.com/office/drawing/2014/main" id="{8FF7689E-B3AE-424F-BBAC-FE886A2998B1}"/>
+                <a16:creationId xmlns:a16="http://schemas.microsoft.com/office/drawing/2014/main" id="{2816675C-2774-1347-9578-FC7CB41F9EB9}"/>
               </a:ext>
             </a:extLst>
           </p:cNvPr>
           <p:cNvCxnSpPr>
-            <a:stCxn id="48" idx="2"/>
-            <a:endCxn id="23" idx="0"/>
+            <a:cxnSpLocks/>
+            <a:stCxn id="16" idx="3"/>
+            <a:endCxn id="61" idx="3"/>
           </p:cNvCxnSpPr>
           <p:nvPr/>
         </p:nvCxnSpPr>
         <p:spPr>
-          <a:xfrm>
-            <a:off x="2646023" y="4131175"/>
-            <a:ext cx="0" cy="364625"/>
+          <a:xfrm rot="5400000">
+            <a:off x="4287154" y="2673185"/>
+            <a:ext cx="1630000" cy="855630"/>
           </a:xfrm>
-          <a:prstGeom prst="straightConnector1">
+          <a:prstGeom prst="bentConnector2">
             <a:avLst/>
           </a:prstGeom>
-          <a:ln w="19050">
+          <a:ln w="6350">
             <a:solidFill>
               <a:schemeClr val="accent3"/>
             </a:solidFill>
             <a:headEnd type="none" w="med" len="med"/>
-            <a:tailEnd type="arrow" w="med" len="med"/>
+            <a:tailEnd type="none" w="med" len="med"/>
           </a:ln>
           <a:effectLst/>
         </p:spPr>
@@ -5597,84 +4590,139 @@
       </p:cxnSp>
       <p:cxnSp>
         <p:nvCxnSpPr>
-          <p:cNvPr id="40" name="Elbow Connector 39">
+          <p:cNvPr id="46" name="Elbow Connector 45">
             <a:extLst>
               <a:ext uri="{FF2B5EF4-FFF2-40B4-BE49-F238E27FC236}">
-                <a16:creationId xmlns:a16="http://schemas.microsoft.com/office/drawing/2014/main" id="{C9160037-07EF-A34C-9A00-AD6BD31E8AA1}"/>
+                <a16:creationId xmlns:a16="http://schemas.microsoft.com/office/drawing/2014/main" id="{37FE60CF-FD7E-EA43-B358-278AA7ACB010}"/>
               </a:ext>
             </a:extLst>
           </p:cNvPr>
           <p:cNvCxnSpPr>
-            <a:cxnSpLocks/>
-            <a:stCxn id="16" idx="3"/>
-            <a:endCxn id="21" idx="3"/>
+            <a:stCxn id="48" idx="3"/>
+            <a:endCxn id="16" idx="3"/>
           </p:cNvCxnSpPr>
           <p:nvPr/>
         </p:nvCxnSpPr>
         <p:spPr>
-          <a:xfrm rot="5400000">
-            <a:off x="3216451" y="1462396"/>
-            <a:ext cx="2651238" cy="1975799"/>
+          <a:xfrm flipV="1">
+            <a:off x="4659555" y="2286000"/>
+            <a:ext cx="870414" cy="1164240"/>
           </a:xfrm>
           <a:prstGeom prst="bentConnector2">
             <a:avLst/>
           </a:prstGeom>
+          <a:ln w="6350">
+            <a:solidFill>
+              <a:schemeClr val="accent3"/>
+            </a:solidFill>
+            <a:headEnd type="none" w="med" len="med"/>
+            <a:tailEnd type="none" w="med" len="med"/>
+          </a:ln>
+          <a:effectLst/>
         </p:spPr>
         <p:style>
           <a:lnRef idx="1">
-            <a:schemeClr val="accent3"/>
+            <a:schemeClr val="accent2"/>
           </a:lnRef>
-          <a:fillRef idx="0">
-            <a:schemeClr val="accent3"/>
+          <a:fillRef idx="2">
+            <a:schemeClr val="accent2"/>
           </a:fillRef>
-          <a:effectRef idx="0">
-            <a:schemeClr val="accent3"/>
+          <a:effectRef idx="1">
+            <a:schemeClr val="accent2"/>
           </a:effectRef>
           <a:fontRef idx="minor">
-            <a:schemeClr val="tx1"/>
+            <a:schemeClr val="dk1"/>
           </a:fontRef>
         </p:style>
       </p:cxnSp>
-      <p:cxnSp>
-        <p:nvCxnSpPr>
-          <p:cNvPr id="43" name="Elbow Connector 42">
+      <p:sp>
+        <p:nvSpPr>
+          <p:cNvPr id="79" name="Freeform 78">
             <a:extLst>
               <a:ext uri="{FF2B5EF4-FFF2-40B4-BE49-F238E27FC236}">
-                <a16:creationId xmlns:a16="http://schemas.microsoft.com/office/drawing/2014/main" id="{4E93881A-AF1C-F348-8076-1BBB88418EC8}"/>
+                <a16:creationId xmlns:a16="http://schemas.microsoft.com/office/drawing/2014/main" id="{941FD361-3A39-5E42-8907-BE620442DF7E}"/>
               </a:ext>
             </a:extLst>
           </p:cNvPr>
-          <p:cNvCxnSpPr>
-            <a:cxnSpLocks/>
-            <a:stCxn id="16" idx="3"/>
-            <a:endCxn id="25" idx="3"/>
-          </p:cNvCxnSpPr>
+          <p:cNvSpPr/>
           <p:nvPr/>
-        </p:nvCxnSpPr>
+        </p:nvSpPr>
         <p:spPr>
-          <a:xfrm rot="5400000">
-            <a:off x="2528403" y="2723940"/>
-            <a:ext cx="4600830" cy="1402303"/>
+          <a:xfrm>
+            <a:off x="4659553" y="3235722"/>
+            <a:ext cx="2075961" cy="167877"/>
           </a:xfrm>
-          <a:prstGeom prst="bentConnector2">
+          <a:custGeom>
             <a:avLst/>
-          </a:prstGeom>
+            <a:gdLst>
+              <a:gd name="connsiteX0" fmla="*/ 0 w 3048000"/>
+              <a:gd name="connsiteY0" fmla="*/ 203200 h 203200"/>
+              <a:gd name="connsiteX1" fmla="*/ 221673 w 3048000"/>
+              <a:gd name="connsiteY1" fmla="*/ 0 h 203200"/>
+              <a:gd name="connsiteX2" fmla="*/ 3048000 w 3048000"/>
+              <a:gd name="connsiteY2" fmla="*/ 0 h 203200"/>
+            </a:gdLst>
+            <a:ahLst/>
+            <a:cxnLst>
+              <a:cxn ang="0">
+                <a:pos x="connsiteX0" y="connsiteY0"/>
+              </a:cxn>
+              <a:cxn ang="0">
+                <a:pos x="connsiteX1" y="connsiteY1"/>
+              </a:cxn>
+              <a:cxn ang="0">
+                <a:pos x="connsiteX2" y="connsiteY2"/>
+              </a:cxn>
+            </a:cxnLst>
+            <a:rect l="l" t="t" r="r" b="b"/>
+            <a:pathLst>
+              <a:path w="3048000" h="203200">
+                <a:moveTo>
+                  <a:pt x="0" y="203200"/>
+                </a:moveTo>
+                <a:lnTo>
+                  <a:pt x="221673" y="0"/>
+                </a:lnTo>
+                <a:lnTo>
+                  <a:pt x="3048000" y="0"/>
+                </a:lnTo>
+              </a:path>
+            </a:pathLst>
+          </a:custGeom>
+          <a:noFill/>
+          <a:ln w="19050">
+            <a:solidFill>
+              <a:schemeClr val="accent3"/>
+            </a:solidFill>
+            <a:prstDash val="solid"/>
+            <a:headEnd type="none" w="med" len="med"/>
+            <a:tailEnd type="arrow" w="med" len="med"/>
+          </a:ln>
+          <a:effectLst/>
         </p:spPr>
         <p:style>
           <a:lnRef idx="1">
-            <a:schemeClr val="accent3"/>
+            <a:schemeClr val="accent2"/>
           </a:lnRef>
-          <a:fillRef idx="0">
-            <a:schemeClr val="accent3"/>
+          <a:fillRef idx="2">
+            <a:schemeClr val="accent2"/>
           </a:fillRef>
-          <a:effectRef idx="0">
-            <a:schemeClr val="accent3"/>
+          <a:effectRef idx="1">
+            <a:schemeClr val="accent2"/>
           </a:effectRef>
           <a:fontRef idx="minor">
-            <a:schemeClr val="tx1"/>
+            <a:schemeClr val="dk1"/>
           </a:fontRef>
         </p:style>
-      </p:cxnSp>
+        <p:txBody>
+          <a:bodyPr rtlCol="0" anchor="ctr"/>
+          <a:lstStyle/>
+          <a:p>
+            <a:pPr algn="ctr"/>
+            <a:endParaRPr lang="en-SG"/>
+          </a:p>
+        </p:txBody>
+      </p:sp>
     </p:spTree>
     <p:extLst>
       <p:ext uri="{BB962C8B-B14F-4D97-AF65-F5344CB8AC3E}">

</xml_diff>